<commit_message>
Added documents for presentation
</commit_message>
<xml_diff>
--- a/backend context diagram.pptx
+++ b/backend context diagram.pptx
@@ -118,12 +118,12 @@
   <pc:docChgLst>
     <pc:chgData userId="4de77596fc931c1f" providerId="LiveId" clId="{DEF7735F-C33B-42B5-891D-DC1E43EAFD3E}"/>
     <pc:docChg chg="undo custSel addSld delSld modSld">
-      <pc:chgData name="" userId="4de77596fc931c1f" providerId="LiveId" clId="{DEF7735F-C33B-42B5-891D-DC1E43EAFD3E}" dt="2022-10-26T04:54:01.585" v="496" actId="1076"/>
+      <pc:chgData name="" userId="4de77596fc931c1f" providerId="LiveId" clId="{DEF7735F-C33B-42B5-891D-DC1E43EAFD3E}" dt="2022-11-08T05:58:28.631" v="523" actId="20577"/>
       <pc:docMkLst>
         <pc:docMk/>
       </pc:docMkLst>
       <pc:sldChg chg="addSp delSp modSp">
-        <pc:chgData name="" userId="4de77596fc931c1f" providerId="LiveId" clId="{DEF7735F-C33B-42B5-891D-DC1E43EAFD3E}" dt="2022-10-26T04:54:01.585" v="496" actId="1076"/>
+        <pc:chgData name="" userId="4de77596fc931c1f" providerId="LiveId" clId="{DEF7735F-C33B-42B5-891D-DC1E43EAFD3E}" dt="2022-11-08T05:58:06.534" v="509" actId="20577"/>
         <pc:sldMkLst>
           <pc:docMk/>
           <pc:sldMk cId="4050542598" sldId="256"/>
@@ -161,7 +161,7 @@
           </ac:spMkLst>
         </pc:spChg>
         <pc:spChg chg="add mod">
-          <ac:chgData name="" userId="4de77596fc931c1f" providerId="LiveId" clId="{DEF7735F-C33B-42B5-891D-DC1E43EAFD3E}" dt="2022-10-26T04:54:01.585" v="496" actId="1076"/>
+          <ac:chgData name="" userId="4de77596fc931c1f" providerId="LiveId" clId="{DEF7735F-C33B-42B5-891D-DC1E43EAFD3E}" dt="2022-11-08T05:58:06.534" v="509" actId="20577"/>
           <ac:spMkLst>
             <pc:docMk/>
             <pc:sldMk cId="4050542598" sldId="256"/>
@@ -346,7 +346,7 @@
         </pc:cxnChg>
       </pc:sldChg>
       <pc:sldChg chg="addSp delSp modSp add">
-        <pc:chgData name="" userId="4de77596fc931c1f" providerId="LiveId" clId="{DEF7735F-C33B-42B5-891D-DC1E43EAFD3E}" dt="2022-10-26T00:43:28.367" v="486" actId="1038"/>
+        <pc:chgData name="" userId="4de77596fc931c1f" providerId="LiveId" clId="{DEF7735F-C33B-42B5-891D-DC1E43EAFD3E}" dt="2022-11-08T05:58:28.631" v="523" actId="20577"/>
         <pc:sldMkLst>
           <pc:docMk/>
           <pc:sldMk cId="3447864335" sldId="257"/>
@@ -384,7 +384,7 @@
           </ac:spMkLst>
         </pc:spChg>
         <pc:spChg chg="add mod ord">
-          <ac:chgData name="" userId="4de77596fc931c1f" providerId="LiveId" clId="{DEF7735F-C33B-42B5-891D-DC1E43EAFD3E}" dt="2022-10-26T00:43:19.945" v="477" actId="1035"/>
+          <ac:chgData name="" userId="4de77596fc931c1f" providerId="LiveId" clId="{DEF7735F-C33B-42B5-891D-DC1E43EAFD3E}" dt="2022-11-08T05:58:28.631" v="523" actId="20577"/>
           <ac:spMkLst>
             <pc:docMk/>
             <pc:sldMk cId="3447864335" sldId="257"/>
@@ -439,13 +439,6 @@
             <ac:spMk id="48" creationId="{EAC2D6BD-2E8D-46B3-8508-A0CEEE16217A}"/>
           </ac:spMkLst>
         </pc:spChg>
-      </pc:sldChg>
-      <pc:sldChg chg="add del">
-        <pc:chgData name="" userId="4de77596fc931c1f" providerId="LiveId" clId="{DEF7735F-C33B-42B5-891D-DC1E43EAFD3E}" dt="2022-10-26T04:53:10.984" v="488" actId="2696"/>
-        <pc:sldMkLst>
-          <pc:docMk/>
-          <pc:sldMk cId="4090388569" sldId="258"/>
-        </pc:sldMkLst>
       </pc:sldChg>
     </pc:docChg>
   </pc:docChgLst>
@@ -751,7 +744,7 @@
           <a:p>
             <a:fld id="{5DD09874-953A-42D7-A9BD-62E4B57A3C71}" type="datetimeFigureOut">
               <a:rPr lang="ko-KR" altLang="en-US" smtClean="0"/>
-              <a:t>2022-10-26</a:t>
+              <a:t>2022-11-08</a:t>
             </a:fld>
             <a:endParaRPr lang="ko-KR" altLang="en-US"/>
           </a:p>
@@ -949,7 +942,7 @@
           <a:p>
             <a:fld id="{5DD09874-953A-42D7-A9BD-62E4B57A3C71}" type="datetimeFigureOut">
               <a:rPr lang="ko-KR" altLang="en-US" smtClean="0"/>
-              <a:t>2022-10-26</a:t>
+              <a:t>2022-11-08</a:t>
             </a:fld>
             <a:endParaRPr lang="ko-KR" altLang="en-US"/>
           </a:p>
@@ -1157,7 +1150,7 @@
           <a:p>
             <a:fld id="{5DD09874-953A-42D7-A9BD-62E4B57A3C71}" type="datetimeFigureOut">
               <a:rPr lang="ko-KR" altLang="en-US" smtClean="0"/>
-              <a:t>2022-10-26</a:t>
+              <a:t>2022-11-08</a:t>
             </a:fld>
             <a:endParaRPr lang="ko-KR" altLang="en-US"/>
           </a:p>
@@ -1355,7 +1348,7 @@
           <a:p>
             <a:fld id="{5DD09874-953A-42D7-A9BD-62E4B57A3C71}" type="datetimeFigureOut">
               <a:rPr lang="ko-KR" altLang="en-US" smtClean="0"/>
-              <a:t>2022-10-26</a:t>
+              <a:t>2022-11-08</a:t>
             </a:fld>
             <a:endParaRPr lang="ko-KR" altLang="en-US"/>
           </a:p>
@@ -1630,7 +1623,7 @@
           <a:p>
             <a:fld id="{5DD09874-953A-42D7-A9BD-62E4B57A3C71}" type="datetimeFigureOut">
               <a:rPr lang="ko-KR" altLang="en-US" smtClean="0"/>
-              <a:t>2022-10-26</a:t>
+              <a:t>2022-11-08</a:t>
             </a:fld>
             <a:endParaRPr lang="ko-KR" altLang="en-US"/>
           </a:p>
@@ -1895,7 +1888,7 @@
           <a:p>
             <a:fld id="{5DD09874-953A-42D7-A9BD-62E4B57A3C71}" type="datetimeFigureOut">
               <a:rPr lang="ko-KR" altLang="en-US" smtClean="0"/>
-              <a:t>2022-10-26</a:t>
+              <a:t>2022-11-08</a:t>
             </a:fld>
             <a:endParaRPr lang="ko-KR" altLang="en-US"/>
           </a:p>
@@ -2307,7 +2300,7 @@
           <a:p>
             <a:fld id="{5DD09874-953A-42D7-A9BD-62E4B57A3C71}" type="datetimeFigureOut">
               <a:rPr lang="ko-KR" altLang="en-US" smtClean="0"/>
-              <a:t>2022-10-26</a:t>
+              <a:t>2022-11-08</a:t>
             </a:fld>
             <a:endParaRPr lang="ko-KR" altLang="en-US"/>
           </a:p>
@@ -2448,7 +2441,7 @@
           <a:p>
             <a:fld id="{5DD09874-953A-42D7-A9BD-62E4B57A3C71}" type="datetimeFigureOut">
               <a:rPr lang="ko-KR" altLang="en-US" smtClean="0"/>
-              <a:t>2022-10-26</a:t>
+              <a:t>2022-11-08</a:t>
             </a:fld>
             <a:endParaRPr lang="ko-KR" altLang="en-US"/>
           </a:p>
@@ -2561,7 +2554,7 @@
           <a:p>
             <a:fld id="{5DD09874-953A-42D7-A9BD-62E4B57A3C71}" type="datetimeFigureOut">
               <a:rPr lang="ko-KR" altLang="en-US" smtClean="0"/>
-              <a:t>2022-10-26</a:t>
+              <a:t>2022-11-08</a:t>
             </a:fld>
             <a:endParaRPr lang="ko-KR" altLang="en-US"/>
           </a:p>
@@ -2872,7 +2865,7 @@
           <a:p>
             <a:fld id="{5DD09874-953A-42D7-A9BD-62E4B57A3C71}" type="datetimeFigureOut">
               <a:rPr lang="ko-KR" altLang="en-US" smtClean="0"/>
-              <a:t>2022-10-26</a:t>
+              <a:t>2022-11-08</a:t>
             </a:fld>
             <a:endParaRPr lang="ko-KR" altLang="en-US"/>
           </a:p>
@@ -3160,7 +3153,7 @@
           <a:p>
             <a:fld id="{5DD09874-953A-42D7-A9BD-62E4B57A3C71}" type="datetimeFigureOut">
               <a:rPr lang="ko-KR" altLang="en-US" smtClean="0"/>
-              <a:t>2022-10-26</a:t>
+              <a:t>2022-11-08</a:t>
             </a:fld>
             <a:endParaRPr lang="ko-KR" altLang="en-US"/>
           </a:p>
@@ -3401,7 +3394,7 @@
           <a:p>
             <a:fld id="{5DD09874-953A-42D7-A9BD-62E4B57A3C71}" type="datetimeFigureOut">
               <a:rPr lang="ko-KR" altLang="en-US" smtClean="0"/>
-              <a:t>2022-10-26</a:t>
+              <a:t>2022-11-08</a:t>
             </a:fld>
             <a:endParaRPr lang="ko-KR" altLang="en-US"/>
           </a:p>
@@ -4342,7 +4335,15 @@
           <a:p>
             <a:r>
               <a:rPr lang="en-US" altLang="ko-KR" dirty="0"/>
-              <a:t>Recommendation System (Python)</a:t>
+              <a:t>Recommendation server</a:t>
+            </a:r>
+            <a:r>
+              <a:rPr lang="ko-KR" altLang="en-US" dirty="0"/>
+              <a:t> </a:t>
+            </a:r>
+            <a:r>
+              <a:rPr lang="en-US" altLang="ko-KR" dirty="0"/>
+              <a:t>(Python)</a:t>
             </a:r>
             <a:endParaRPr lang="ko-KR" altLang="en-US" dirty="0"/>
           </a:p>
@@ -5328,7 +5329,7 @@
           <a:p>
             <a:r>
               <a:rPr lang="en-US" altLang="ko-KR" dirty="0"/>
-              <a:t>Recommendation System (Python)</a:t>
+              <a:t>Recommendation server (Python)</a:t>
             </a:r>
             <a:endParaRPr lang="ko-KR" altLang="en-US" dirty="0"/>
           </a:p>

</xml_diff>